<commit_message>
Update session 25 documents.
</commit_message>
<xml_diff>
--- a/CPSC-24700/Presentations/session-25.pptx
+++ b/CPSC-24700/Presentations/session-25.pptx
@@ -119,6 +119,10 @@
     </p:ext>
   </p:extLst>
 </p:presentation>
+</file>
+
+<file path=ppt/revisionInfo.xml><?xml version="1.0" encoding="utf-8"?>
+<p1510:revInfo xmlns:a="http://schemas.openxmlformats.org/drawingml/2006/main" xmlns:r="http://schemas.openxmlformats.org/officeDocument/2006/relationships" xmlns:p1510="http://schemas.microsoft.com/office/powerpoint/2015/10/main"/>
 </file>
 
 <file path=ppt/notesMasters/notesMaster1.xml><?xml version="1.0" encoding="utf-8"?>
@@ -4868,13 +4872,14 @@
           <a:p>
             <a:r>
               <a:rPr lang="en-US" sz="2000" dirty="0"/>
-              <a:t>Complete Ch.10.1 through 10.2 </a:t>
-            </a:r>
-            <a:r>
-              <a:rPr lang="en-US" sz="2000"/>
-              <a:t>on Ajax</a:t>
-            </a:r>
-            <a:endParaRPr lang="en-US" sz="2000" dirty="0"/>
+              <a:t>Complete Ch.10.1 through 10.2 on Ajax</a:t>
+            </a:r>
+          </a:p>
+          <a:p>
+            <a:r>
+              <a:rPr lang="en-US" sz="2000" dirty="0"/>
+              <a:t>Review associated AJAX slides</a:t>
+            </a:r>
           </a:p>
         </p:txBody>
       </p:sp>

</xml_diff>